<commit_message>
Template changes - generic now
</commit_message>
<xml_diff>
--- a/report_gen/templates/rpt-template-ws.pptx
+++ b/report_gen/templates/rpt-template-ws.pptx
@@ -4,6 +4,9 @@
   <p:sldMasterIdLst>
     <p:sldMasterId id="2147483649" r:id="rId1"/>
   </p:sldMasterIdLst>
+  <p:notesMasterIdLst>
+    <p:notesMasterId r:id="rId2"/>
+  </p:notesMasterIdLst>
   <p:sldSz cx="12192000" cy="6858000"/>
   <p:notesSz cx="6858000" cy="9144000"/>
   <p:defaultTextStyle>
@@ -109,6 +112,355 @@
 </p:presentation>
 </file>
 
+<file path=ppt/notesMasters/notesMaster1.xml><?xml version="1.0" encoding="utf-8"?>
+<p:notesMaster xmlns:a="http://schemas.openxmlformats.org/drawingml/2006/main" xmlns:r="http://schemas.openxmlformats.org/officeDocument/2006/relationships" xmlns:p="http://schemas.openxmlformats.org/presentationml/2006/main">
+  <p:cSld>
+    <p:bg>
+      <p:bgRef idx="1001">
+        <a:schemeClr val="bg1"/>
+      </p:bgRef>
+    </p:bg>
+    <p:spTree>
+      <p:nvGrpSpPr>
+        <p:cNvPr id="1" name=""/>
+        <p:cNvGrpSpPr/>
+        <p:nvPr/>
+      </p:nvGrpSpPr>
+      <p:grpSpPr>
+        <a:xfrm>
+          <a:off x="0" y="0"/>
+          <a:ext cx="0" cy="0"/>
+          <a:chOff x="0" y="0"/>
+          <a:chExt cx="0" cy="0"/>
+        </a:xfrm>
+      </p:grpSpPr>
+      <p:sp>
+        <p:nvSpPr>
+          <p:cNvPr id="2" name="Header Placeholder 1"/>
+          <p:cNvSpPr>
+            <a:spLocks noGrp="1"/>
+          </p:cNvSpPr>
+          <p:nvPr>
+            <p:ph type="hdr" sz="quarter"/>
+          </p:nvPr>
+        </p:nvSpPr>
+        <p:spPr>
+          <a:xfrm>
+            <a:off x="0" y="0"/>
+            <a:ext cx="2971800" cy="458788"/>
+          </a:xfrm>
+          <a:prstGeom prst="rect">
+            <a:avLst/>
+          </a:prstGeom>
+        </p:spPr>
+        <p:txBody>
+          <a:bodyPr vert="horz" lIns="91440" tIns="45720" rIns="91440" bIns="45720" rtlCol="0"/>
+          <a:lstStyle>
+            <a:lvl1pPr algn="l">
+              <a:defRPr sz="1200"/>
+            </a:lvl1pPr>
+          </a:lstStyle>
+          <a:p>
+            <a:endParaRPr lang="en-US"/>
+          </a:p>
+        </p:txBody>
+      </p:sp>
+      <p:sp>
+        <p:nvSpPr>
+          <p:cNvPr id="3" name="Date Placeholder 2"/>
+          <p:cNvSpPr>
+            <a:spLocks noGrp="1"/>
+          </p:cNvSpPr>
+          <p:nvPr>
+            <p:ph type="dt" idx="1"/>
+          </p:nvPr>
+        </p:nvSpPr>
+        <p:spPr>
+          <a:xfrm>
+            <a:off x="3884613" y="0"/>
+            <a:ext cx="2971800" cy="458788"/>
+          </a:xfrm>
+          <a:prstGeom prst="rect">
+            <a:avLst/>
+          </a:prstGeom>
+        </p:spPr>
+        <p:txBody>
+          <a:bodyPr vert="horz" lIns="91440" tIns="45720" rIns="91440" bIns="45720" rtlCol="0"/>
+          <a:lstStyle>
+            <a:lvl1pPr algn="r">
+              <a:defRPr sz="1200"/>
+            </a:lvl1pPr>
+          </a:lstStyle>
+          <a:p>
+            <a:fld id="{C8198977-C51C-4A04-9633-C3F379210A9A}" type="datetimeFigureOut">
+              <a:rPr lang="en-US" smtClean="0"/>
+              <a:t>2/26/2024</a:t>
+            </a:fld>
+            <a:endParaRPr lang="en-US"/>
+          </a:p>
+        </p:txBody>
+      </p:sp>
+      <p:sp>
+        <p:nvSpPr>
+          <p:cNvPr id="4" name="Slide Image Placeholder 3"/>
+          <p:cNvSpPr>
+            <a:spLocks noGrp="1" noRot="1" noChangeAspect="1"/>
+          </p:cNvSpPr>
+          <p:nvPr>
+            <p:ph type="sldImg" idx="2"/>
+          </p:nvPr>
+        </p:nvSpPr>
+        <p:spPr>
+          <a:xfrm>
+            <a:off x="685800" y="1143000"/>
+            <a:ext cx="5486400" cy="3086100"/>
+          </a:xfrm>
+          <a:prstGeom prst="rect">
+            <a:avLst/>
+          </a:prstGeom>
+          <a:noFill/>
+          <a:ln w="12700">
+            <a:solidFill>
+              <a:prstClr val="black"/>
+            </a:solidFill>
+          </a:ln>
+        </p:spPr>
+        <p:txBody>
+          <a:bodyPr vert="horz" lIns="91440" tIns="45720" rIns="91440" bIns="45720" rtlCol="0" anchor="ctr"/>
+          <a:lstStyle/>
+          <a:p>
+            <a:endParaRPr lang="en-US"/>
+          </a:p>
+        </p:txBody>
+      </p:sp>
+      <p:sp>
+        <p:nvSpPr>
+          <p:cNvPr id="5" name="Notes Placeholder 4"/>
+          <p:cNvSpPr>
+            <a:spLocks noGrp="1"/>
+          </p:cNvSpPr>
+          <p:nvPr>
+            <p:ph type="body" sz="quarter" idx="3"/>
+          </p:nvPr>
+        </p:nvSpPr>
+        <p:spPr>
+          <a:xfrm>
+            <a:off x="685800" y="4400550"/>
+            <a:ext cx="5486400" cy="3600450"/>
+          </a:xfrm>
+          <a:prstGeom prst="rect">
+            <a:avLst/>
+          </a:prstGeom>
+        </p:spPr>
+        <p:txBody>
+          <a:bodyPr vert="horz" lIns="91440" tIns="45720" rIns="91440" bIns="45720" rtlCol="0"/>
+          <a:lstStyle/>
+          <a:p>
+            <a:pPr lvl="0"/>
+            <a:r>
+              <a:rPr lang="en-US"/>
+              <a:t>Click to edit Master text styles</a:t>
+            </a:r>
+          </a:p>
+          <a:p>
+            <a:pPr lvl="1"/>
+            <a:r>
+              <a:rPr lang="en-US"/>
+              <a:t>Second level</a:t>
+            </a:r>
+          </a:p>
+          <a:p>
+            <a:pPr lvl="2"/>
+            <a:r>
+              <a:rPr lang="en-US"/>
+              <a:t>Third level</a:t>
+            </a:r>
+          </a:p>
+          <a:p>
+            <a:pPr lvl="3"/>
+            <a:r>
+              <a:rPr lang="en-US"/>
+              <a:t>Fourth level</a:t>
+            </a:r>
+          </a:p>
+          <a:p>
+            <a:pPr lvl="4"/>
+            <a:r>
+              <a:rPr lang="en-US"/>
+              <a:t>Fifth level</a:t>
+            </a:r>
+          </a:p>
+        </p:txBody>
+      </p:sp>
+      <p:sp>
+        <p:nvSpPr>
+          <p:cNvPr id="6" name="Footer Placeholder 5"/>
+          <p:cNvSpPr>
+            <a:spLocks noGrp="1"/>
+          </p:cNvSpPr>
+          <p:nvPr>
+            <p:ph type="ftr" sz="quarter" idx="4"/>
+          </p:nvPr>
+        </p:nvSpPr>
+        <p:spPr>
+          <a:xfrm>
+            <a:off x="0" y="8685213"/>
+            <a:ext cx="2971800" cy="458787"/>
+          </a:xfrm>
+          <a:prstGeom prst="rect">
+            <a:avLst/>
+          </a:prstGeom>
+        </p:spPr>
+        <p:txBody>
+          <a:bodyPr vert="horz" lIns="91440" tIns="45720" rIns="91440" bIns="45720" rtlCol="0" anchor="b"/>
+          <a:lstStyle>
+            <a:lvl1pPr algn="l">
+              <a:defRPr sz="1200"/>
+            </a:lvl1pPr>
+          </a:lstStyle>
+          <a:p>
+            <a:endParaRPr lang="en-US"/>
+          </a:p>
+        </p:txBody>
+      </p:sp>
+      <p:sp>
+        <p:nvSpPr>
+          <p:cNvPr id="7" name="Slide Number Placeholder 6"/>
+          <p:cNvSpPr>
+            <a:spLocks noGrp="1"/>
+          </p:cNvSpPr>
+          <p:nvPr>
+            <p:ph type="sldNum" sz="quarter" idx="5"/>
+          </p:nvPr>
+        </p:nvSpPr>
+        <p:spPr>
+          <a:xfrm>
+            <a:off x="3884613" y="8685213"/>
+            <a:ext cx="2971800" cy="458787"/>
+          </a:xfrm>
+          <a:prstGeom prst="rect">
+            <a:avLst/>
+          </a:prstGeom>
+        </p:spPr>
+        <p:txBody>
+          <a:bodyPr vert="horz" lIns="91440" tIns="45720" rIns="91440" bIns="45720" rtlCol="0" anchor="b"/>
+          <a:lstStyle>
+            <a:lvl1pPr algn="r">
+              <a:defRPr sz="1200"/>
+            </a:lvl1pPr>
+          </a:lstStyle>
+          <a:p>
+            <a:fld id="{6FC9018F-695A-4DAF-93EB-64CE045E15F7}" type="slidenum">
+              <a:rPr lang="en-US" smtClean="0"/>
+              <a:t>‹#›</a:t>
+            </a:fld>
+            <a:endParaRPr lang="en-US"/>
+          </a:p>
+        </p:txBody>
+      </p:sp>
+    </p:spTree>
+    <p:extLst>
+      <p:ext uri="{BB962C8B-B14F-4D97-AF65-F5344CB8AC3E}">
+        <p14:creationId xmlns:p14="http://schemas.microsoft.com/office/powerpoint/2010/main" val="1214175911"/>
+      </p:ext>
+    </p:extLst>
+  </p:cSld>
+  <p:clrMap bg1="lt1" tx1="dk1" bg2="lt2" tx2="dk2" accent1="accent1" accent2="accent2" accent3="accent3" accent4="accent4" accent5="accent5" accent6="accent6" hlink="hlink" folHlink="folHlink"/>
+  <p:notesStyle>
+    <a:lvl1pPr marL="0" algn="l" defTabSz="914400" rtl="0" eaLnBrk="1" latinLnBrk="0" hangingPunct="1">
+      <a:defRPr sz="1200" kern="1200">
+        <a:solidFill>
+          <a:schemeClr val="tx1"/>
+        </a:solidFill>
+        <a:latin typeface="+mn-lt"/>
+        <a:ea typeface="+mn-ea"/>
+        <a:cs typeface="+mn-cs"/>
+      </a:defRPr>
+    </a:lvl1pPr>
+    <a:lvl2pPr marL="457200" algn="l" defTabSz="914400" rtl="0" eaLnBrk="1" latinLnBrk="0" hangingPunct="1">
+      <a:defRPr sz="1200" kern="1200">
+        <a:solidFill>
+          <a:schemeClr val="tx1"/>
+        </a:solidFill>
+        <a:latin typeface="+mn-lt"/>
+        <a:ea typeface="+mn-ea"/>
+        <a:cs typeface="+mn-cs"/>
+      </a:defRPr>
+    </a:lvl2pPr>
+    <a:lvl3pPr marL="914400" algn="l" defTabSz="914400" rtl="0" eaLnBrk="1" latinLnBrk="0" hangingPunct="1">
+      <a:defRPr sz="1200" kern="1200">
+        <a:solidFill>
+          <a:schemeClr val="tx1"/>
+        </a:solidFill>
+        <a:latin typeface="+mn-lt"/>
+        <a:ea typeface="+mn-ea"/>
+        <a:cs typeface="+mn-cs"/>
+      </a:defRPr>
+    </a:lvl3pPr>
+    <a:lvl4pPr marL="1371600" algn="l" defTabSz="914400" rtl="0" eaLnBrk="1" latinLnBrk="0" hangingPunct="1">
+      <a:defRPr sz="1200" kern="1200">
+        <a:solidFill>
+          <a:schemeClr val="tx1"/>
+        </a:solidFill>
+        <a:latin typeface="+mn-lt"/>
+        <a:ea typeface="+mn-ea"/>
+        <a:cs typeface="+mn-cs"/>
+      </a:defRPr>
+    </a:lvl4pPr>
+    <a:lvl5pPr marL="1828800" algn="l" defTabSz="914400" rtl="0" eaLnBrk="1" latinLnBrk="0" hangingPunct="1">
+      <a:defRPr sz="1200" kern="1200">
+        <a:solidFill>
+          <a:schemeClr val="tx1"/>
+        </a:solidFill>
+        <a:latin typeface="+mn-lt"/>
+        <a:ea typeface="+mn-ea"/>
+        <a:cs typeface="+mn-cs"/>
+      </a:defRPr>
+    </a:lvl5pPr>
+    <a:lvl6pPr marL="2286000" algn="l" defTabSz="914400" rtl="0" eaLnBrk="1" latinLnBrk="0" hangingPunct="1">
+      <a:defRPr sz="1200" kern="1200">
+        <a:solidFill>
+          <a:schemeClr val="tx1"/>
+        </a:solidFill>
+        <a:latin typeface="+mn-lt"/>
+        <a:ea typeface="+mn-ea"/>
+        <a:cs typeface="+mn-cs"/>
+      </a:defRPr>
+    </a:lvl6pPr>
+    <a:lvl7pPr marL="2743200" algn="l" defTabSz="914400" rtl="0" eaLnBrk="1" latinLnBrk="0" hangingPunct="1">
+      <a:defRPr sz="1200" kern="1200">
+        <a:solidFill>
+          <a:schemeClr val="tx1"/>
+        </a:solidFill>
+        <a:latin typeface="+mn-lt"/>
+        <a:ea typeface="+mn-ea"/>
+        <a:cs typeface="+mn-cs"/>
+      </a:defRPr>
+    </a:lvl7pPr>
+    <a:lvl8pPr marL="3200400" algn="l" defTabSz="914400" rtl="0" eaLnBrk="1" latinLnBrk="0" hangingPunct="1">
+      <a:defRPr sz="1200" kern="1200">
+        <a:solidFill>
+          <a:schemeClr val="tx1"/>
+        </a:solidFill>
+        <a:latin typeface="+mn-lt"/>
+        <a:ea typeface="+mn-ea"/>
+        <a:cs typeface="+mn-cs"/>
+      </a:defRPr>
+    </a:lvl8pPr>
+    <a:lvl9pPr marL="3657600" algn="l" defTabSz="914400" rtl="0" eaLnBrk="1" latinLnBrk="0" hangingPunct="1">
+      <a:defRPr sz="1200" kern="1200">
+        <a:solidFill>
+          <a:schemeClr val="tx1"/>
+        </a:solidFill>
+        <a:latin typeface="+mn-lt"/>
+        <a:ea typeface="+mn-ea"/>
+        <a:cs typeface="+mn-cs"/>
+      </a:defRPr>
+    </a:lvl9pPr>
+  </p:notesStyle>
+</p:notesMaster>
+</file>
+
 <file path=ppt/slideLayouts/slideLayout1.xml><?xml version="1.0" encoding="utf-8"?>
 <p:sldLayout xmlns:a="http://schemas.openxmlformats.org/drawingml/2006/main" xmlns:r="http://schemas.openxmlformats.org/officeDocument/2006/relationships" xmlns:p="http://schemas.openxmlformats.org/presentationml/2006/main" preserve="1" userDrawn="1">
   <p:cSld name="Main Title">
@@ -226,14 +578,7 @@
             <a:pPr>
               <a:defRPr/>
             </a:pPr>
-            <a:r>
-              <a:rPr lang="en-US" sz="1200" b="1" spc="300" dirty="0"/>
-              <a:t>CISA | </a:t>
-            </a:r>
-            <a:r>
-              <a:rPr lang="en-US" sz="1200" spc="300" dirty="0"/>
-              <a:t>CYBERSECURITY AND INFRASTRUCTURE SECURITY AGENCY</a:t>
-            </a:r>
+            <a:endParaRPr lang="en-US" sz="1200" spc="300" dirty="0"/>
           </a:p>
         </p:txBody>
       </p:sp>
@@ -572,7 +917,7 @@
                   <a:srgbClr val="5A5B5C"/>
                 </a:solidFill>
               </a:rPr>
-              <a:t>FOR OFFICIAL USE ONLY</a:t>
+              <a:t>CONFIDENTIAL</a:t>
             </a:r>
           </a:p>
         </p:txBody>
@@ -814,41 +1159,6 @@
           </a:p>
         </p:txBody>
       </p:sp>
-      <p:pic>
-        <p:nvPicPr>
-          <p:cNvPr id="7" name="Picture 6">
-            <a:extLst>
-              <a:ext uri="{FF2B5EF4-FFF2-40B4-BE49-F238E27FC236}">
-                <a16:creationId xmlns:a16="http://schemas.microsoft.com/office/drawing/2014/main" id="{BD106CA4-0CC0-C3CC-B726-6787EF777AED}"/>
-              </a:ext>
-            </a:extLst>
-          </p:cNvPr>
-          <p:cNvPicPr>
-            <a:picLocks noChangeAspect="1"/>
-          </p:cNvPicPr>
-          <p:nvPr userDrawn="1"/>
-        </p:nvPicPr>
-        <p:blipFill>
-          <a:blip r:embed="rId2">
-            <a:extLst>
-              <a:ext uri="{28A0092B-C50C-407E-A947-70E740481C1C}">
-                <a14:useLocalDpi xmlns:a14="http://schemas.microsoft.com/office/drawing/2010/main" val="0"/>
-              </a:ext>
-            </a:extLst>
-          </a:blip>
-          <a:srcRect/>
-          <a:stretch/>
-        </p:blipFill>
-        <p:spPr>
-          <a:xfrm>
-            <a:off x="381000" y="5643650"/>
-            <a:ext cx="1066800" cy="1061950"/>
-          </a:xfrm>
-          <a:prstGeom prst="rect">
-            <a:avLst/>
-          </a:prstGeom>
-        </p:spPr>
-      </p:pic>
     </p:spTree>
     <p:extLst>
       <p:ext uri="{BB962C8B-B14F-4D97-AF65-F5344CB8AC3E}">
@@ -1070,42 +1380,6 @@
           </a:p>
         </p:txBody>
       </p:sp>
-      <p:pic>
-        <p:nvPicPr>
-          <p:cNvPr id="3" name="Picture 2" descr="A close up of a logo&#10;&#10;Description automatically generated">
-            <a:extLst>
-              <a:ext uri="{FF2B5EF4-FFF2-40B4-BE49-F238E27FC236}">
-                <a16:creationId xmlns:a16="http://schemas.microsoft.com/office/drawing/2014/main" id="{667BDF82-12E3-3724-1C61-72236791F7FC}"/>
-              </a:ext>
-            </a:extLst>
-          </p:cNvPr>
-          <p:cNvPicPr>
-            <a:picLocks noChangeAspect="1"/>
-          </p:cNvPicPr>
-          <p:nvPr userDrawn="1"/>
-        </p:nvPicPr>
-        <p:blipFill>
-          <a:blip r:embed="rId2">
-            <a:extLst>
-              <a:ext uri="{28A0092B-C50C-407E-A947-70E740481C1C}">
-                <a14:useLocalDpi xmlns:a14="http://schemas.microsoft.com/office/drawing/2010/main" val="0"/>
-              </a:ext>
-            </a:extLst>
-          </a:blip>
-          <a:stretch>
-            <a:fillRect/>
-          </a:stretch>
-        </p:blipFill>
-        <p:spPr>
-          <a:xfrm>
-            <a:off x="1447800" y="1828800"/>
-            <a:ext cx="3200400" cy="3200400"/>
-          </a:xfrm>
-          <a:prstGeom prst="rect">
-            <a:avLst/>
-          </a:prstGeom>
-        </p:spPr>
-      </p:pic>
     </p:spTree>
     <p:extLst>
       <p:ext uri="{BB962C8B-B14F-4D97-AF65-F5344CB8AC3E}">
@@ -1760,42 +2034,6 @@
           </a:p>
         </p:txBody>
       </p:sp>
-      <p:pic>
-        <p:nvPicPr>
-          <p:cNvPr id="4" name="Picture 3" descr="A close up of a logo&#10;&#10;Description automatically generated">
-            <a:extLst>
-              <a:ext uri="{FF2B5EF4-FFF2-40B4-BE49-F238E27FC236}">
-                <a16:creationId xmlns:a16="http://schemas.microsoft.com/office/drawing/2014/main" id="{39A5C02F-1B74-8573-6E26-F07BCDCD974E}"/>
-              </a:ext>
-            </a:extLst>
-          </p:cNvPr>
-          <p:cNvPicPr>
-            <a:picLocks noChangeAspect="1"/>
-          </p:cNvPicPr>
-          <p:nvPr userDrawn="1"/>
-        </p:nvPicPr>
-        <p:blipFill>
-          <a:blip r:embed="rId2">
-            <a:extLst>
-              <a:ext uri="{28A0092B-C50C-407E-A947-70E740481C1C}">
-                <a14:useLocalDpi xmlns:a14="http://schemas.microsoft.com/office/drawing/2010/main" val="0"/>
-              </a:ext>
-            </a:extLst>
-          </a:blip>
-          <a:stretch>
-            <a:fillRect/>
-          </a:stretch>
-        </p:blipFill>
-        <p:spPr>
-          <a:xfrm>
-            <a:off x="1447800" y="1828800"/>
-            <a:ext cx="3200400" cy="3200400"/>
-          </a:xfrm>
-          <a:prstGeom prst="rect">
-            <a:avLst/>
-          </a:prstGeom>
-        </p:spPr>
-      </p:pic>
     </p:spTree>
     <p:extLst>
       <p:ext uri="{BB962C8B-B14F-4D97-AF65-F5344CB8AC3E}">
@@ -2065,42 +2303,6 @@
           </a:p>
         </p:txBody>
       </p:sp>
-      <p:pic>
-        <p:nvPicPr>
-          <p:cNvPr id="3" name="Picture 2" descr="A close up of a logo&#10;&#10;Description automatically generated">
-            <a:extLst>
-              <a:ext uri="{FF2B5EF4-FFF2-40B4-BE49-F238E27FC236}">
-                <a16:creationId xmlns:a16="http://schemas.microsoft.com/office/drawing/2014/main" id="{287AA5BE-62C3-FBAE-8646-18D9665ED2E6}"/>
-              </a:ext>
-            </a:extLst>
-          </p:cNvPr>
-          <p:cNvPicPr>
-            <a:picLocks noChangeAspect="1"/>
-          </p:cNvPicPr>
-          <p:nvPr userDrawn="1"/>
-        </p:nvPicPr>
-        <p:blipFill>
-          <a:blip r:embed="rId2">
-            <a:extLst>
-              <a:ext uri="{28A0092B-C50C-407E-A947-70E740481C1C}">
-                <a14:useLocalDpi xmlns:a14="http://schemas.microsoft.com/office/drawing/2010/main" val="0"/>
-              </a:ext>
-            </a:extLst>
-          </a:blip>
-          <a:stretch>
-            <a:fillRect/>
-          </a:stretch>
-        </p:blipFill>
-        <p:spPr>
-          <a:xfrm>
-            <a:off x="1447800" y="1828800"/>
-            <a:ext cx="3200400" cy="3200400"/>
-          </a:xfrm>
-          <a:prstGeom prst="rect">
-            <a:avLst/>
-          </a:prstGeom>
-        </p:spPr>
-      </p:pic>
     </p:spTree>
     <p:extLst>
       <p:ext uri="{BB962C8B-B14F-4D97-AF65-F5344CB8AC3E}">
@@ -2383,8 +2585,8 @@
         </p:nvSpPr>
         <p:spPr bwMode="auto">
           <a:xfrm>
-            <a:off x="8189018" y="1973908"/>
-            <a:ext cx="3717748" cy="2769989"/>
+            <a:off x="8118486" y="1973908"/>
+            <a:ext cx="3788280" cy="2431435"/>
           </a:xfrm>
           <a:prstGeom prst="rect">
             <a:avLst/>
@@ -2537,24 +2739,21 @@
                 </a:solidFill>
                 <a:latin typeface="+mn-lt"/>
               </a:rPr>
-              <a:t>More information:</a:t>
+              <a:t>For more information,</a:t>
             </a:r>
           </a:p>
           <a:p>
             <a:pPr algn="r">
-              <a:lnSpc>
-                <a:spcPts val="2400"/>
-              </a:lnSpc>
               <a:defRPr/>
             </a:pPr>
             <a:r>
-              <a:rPr lang="en-US" altLang="en-US" sz="1800" b="1" dirty="0" err="1">
+              <a:rPr lang="en-US" altLang="en-US" sz="1800" dirty="0">
                 <a:solidFill>
                   <a:srgbClr val="5A5B5C"/>
                 </a:solidFill>
                 <a:latin typeface="+mn-lt"/>
               </a:rPr>
-              <a:t>cisa.gov</a:t>
+              <a:t>contact the security team.</a:t>
             </a:r>
             <a:endParaRPr lang="en-US" altLang="en-US" sz="1800" b="1" dirty="0">
               <a:solidFill>
@@ -2591,7 +2790,7 @@
                 </a:solidFill>
                 <a:latin typeface="+mn-lt"/>
               </a:rPr>
-              <a:t>Request services:</a:t>
+              <a:t>To request services,</a:t>
             </a:r>
           </a:p>
           <a:p>
@@ -2602,13 +2801,13 @@
               <a:defRPr/>
             </a:pPr>
             <a:r>
-              <a:rPr lang="en-US" altLang="en-US" sz="1800" b="1" dirty="0" err="1">
+              <a:rPr lang="en-US" altLang="en-US" sz="1800" dirty="0">
                 <a:solidFill>
                   <a:srgbClr val="5A5B5C"/>
                 </a:solidFill>
                 <a:latin typeface="+mn-lt"/>
               </a:rPr>
-              <a:t>vulnerability_info@cisa.dhs.gov</a:t>
+              <a:t>Contact the security team by email.</a:t>
             </a:r>
             <a:endParaRPr lang="en-US" altLang="en-US" sz="1800" b="1" dirty="0">
               <a:solidFill>
@@ -2633,20 +2832,6 @@
           </a:p>
           <a:p>
             <a:pPr algn="r">
-              <a:lnSpc>
-                <a:spcPts val="2400"/>
-              </a:lnSpc>
-              <a:defRPr/>
-            </a:pPr>
-            <a:endParaRPr lang="en-US" altLang="en-US" sz="1800" b="1" dirty="0">
-              <a:solidFill>
-                <a:srgbClr val="5A5B5C"/>
-              </a:solidFill>
-              <a:latin typeface="+mn-lt"/>
-            </a:endParaRPr>
-          </a:p>
-          <a:p>
-            <a:pPr algn="r">
               <a:defRPr/>
             </a:pPr>
             <a:endParaRPr lang="en-US" altLang="en-US" sz="1800" dirty="0">
@@ -2658,42 +2843,6 @@
           </a:p>
         </p:txBody>
       </p:sp>
-      <p:pic>
-        <p:nvPicPr>
-          <p:cNvPr id="5" name="Picture 4" descr="A close up of a logo&#10;&#10;Description automatically generated">
-            <a:extLst>
-              <a:ext uri="{FF2B5EF4-FFF2-40B4-BE49-F238E27FC236}">
-                <a16:creationId xmlns:a16="http://schemas.microsoft.com/office/drawing/2014/main" id="{6CED24D4-B833-2C4C-BD3A-0298052AA216}"/>
-              </a:ext>
-            </a:extLst>
-          </p:cNvPr>
-          <p:cNvPicPr>
-            <a:picLocks noChangeAspect="1"/>
-          </p:cNvPicPr>
-          <p:nvPr userDrawn="1"/>
-        </p:nvPicPr>
-        <p:blipFill>
-          <a:blip r:embed="rId2">
-            <a:extLst>
-              <a:ext uri="{28A0092B-C50C-407E-A947-70E740481C1C}">
-                <a14:useLocalDpi xmlns:a14="http://schemas.microsoft.com/office/drawing/2010/main" val="0"/>
-              </a:ext>
-            </a:extLst>
-          </a:blip>
-          <a:stretch>
-            <a:fillRect/>
-          </a:stretch>
-        </p:blipFill>
-        <p:spPr>
-          <a:xfrm>
-            <a:off x="1447800" y="1828800"/>
-            <a:ext cx="3200400" cy="3200400"/>
-          </a:xfrm>
-          <a:prstGeom prst="rect">
-            <a:avLst/>
-          </a:prstGeom>
-        </p:spPr>
-      </p:pic>
     </p:spTree>
     <p:extLst>
       <p:ext uri="{BB962C8B-B14F-4D97-AF65-F5344CB8AC3E}">
@@ -2893,41 +3042,6 @@
           </a:p>
         </p:txBody>
       </p:sp>
-      <p:pic>
-        <p:nvPicPr>
-          <p:cNvPr id="4" name="Picture 3">
-            <a:extLst>
-              <a:ext uri="{FF2B5EF4-FFF2-40B4-BE49-F238E27FC236}">
-                <a16:creationId xmlns:a16="http://schemas.microsoft.com/office/drawing/2014/main" id="{BD22D347-62A9-81C6-4D85-3729F1B56998}"/>
-              </a:ext>
-            </a:extLst>
-          </p:cNvPr>
-          <p:cNvPicPr>
-            <a:picLocks noChangeAspect="1"/>
-          </p:cNvPicPr>
-          <p:nvPr userDrawn="1"/>
-        </p:nvPicPr>
-        <p:blipFill>
-          <a:blip r:embed="rId2">
-            <a:extLst>
-              <a:ext uri="{28A0092B-C50C-407E-A947-70E740481C1C}">
-                <a14:useLocalDpi xmlns:a14="http://schemas.microsoft.com/office/drawing/2010/main" val="0"/>
-              </a:ext>
-            </a:extLst>
-          </a:blip>
-          <a:srcRect/>
-          <a:stretch/>
-        </p:blipFill>
-        <p:spPr>
-          <a:xfrm>
-            <a:off x="381000" y="5643650"/>
-            <a:ext cx="1066800" cy="1061950"/>
-          </a:xfrm>
-          <a:prstGeom prst="rect">
-            <a:avLst/>
-          </a:prstGeom>
-        </p:spPr>
-      </p:pic>
       <p:sp>
         <p:nvSpPr>
           <p:cNvPr id="18" name="TextBox 17">
@@ -3413,41 +3527,6 @@
           </a:p>
         </p:txBody>
       </p:sp>
-      <p:pic>
-        <p:nvPicPr>
-          <p:cNvPr id="2" name="Picture 1">
-            <a:extLst>
-              <a:ext uri="{FF2B5EF4-FFF2-40B4-BE49-F238E27FC236}">
-                <a16:creationId xmlns:a16="http://schemas.microsoft.com/office/drawing/2014/main" id="{13C47DDF-BFC8-3777-D091-53F7720476F1}"/>
-              </a:ext>
-            </a:extLst>
-          </p:cNvPr>
-          <p:cNvPicPr>
-            <a:picLocks noChangeAspect="1"/>
-          </p:cNvPicPr>
-          <p:nvPr userDrawn="1"/>
-        </p:nvPicPr>
-        <p:blipFill>
-          <a:blip r:embed="rId2">
-            <a:extLst>
-              <a:ext uri="{28A0092B-C50C-407E-A947-70E740481C1C}">
-                <a14:useLocalDpi xmlns:a14="http://schemas.microsoft.com/office/drawing/2010/main" val="0"/>
-              </a:ext>
-            </a:extLst>
-          </a:blip>
-          <a:srcRect/>
-          <a:stretch/>
-        </p:blipFill>
-        <p:spPr>
-          <a:xfrm>
-            <a:off x="381000" y="5643650"/>
-            <a:ext cx="1066800" cy="1061950"/>
-          </a:xfrm>
-          <a:prstGeom prst="rect">
-            <a:avLst/>
-          </a:prstGeom>
-        </p:spPr>
-      </p:pic>
     </p:spTree>
     <p:extLst>
       <p:ext uri="{BB962C8B-B14F-4D97-AF65-F5344CB8AC3E}">
@@ -3622,41 +3701,6 @@
           </a:p>
         </p:txBody>
       </p:sp>
-      <p:pic>
-        <p:nvPicPr>
-          <p:cNvPr id="3" name="Picture 2">
-            <a:extLst>
-              <a:ext uri="{FF2B5EF4-FFF2-40B4-BE49-F238E27FC236}">
-                <a16:creationId xmlns:a16="http://schemas.microsoft.com/office/drawing/2014/main" id="{455D2FE2-80C0-8729-0325-3D3448CFAEC8}"/>
-              </a:ext>
-            </a:extLst>
-          </p:cNvPr>
-          <p:cNvPicPr>
-            <a:picLocks noChangeAspect="1"/>
-          </p:cNvPicPr>
-          <p:nvPr userDrawn="1"/>
-        </p:nvPicPr>
-        <p:blipFill>
-          <a:blip r:embed="rId2">
-            <a:extLst>
-              <a:ext uri="{28A0092B-C50C-407E-A947-70E740481C1C}">
-                <a14:useLocalDpi xmlns:a14="http://schemas.microsoft.com/office/drawing/2010/main" val="0"/>
-              </a:ext>
-            </a:extLst>
-          </a:blip>
-          <a:srcRect/>
-          <a:stretch/>
-        </p:blipFill>
-        <p:spPr>
-          <a:xfrm>
-            <a:off x="381000" y="5643650"/>
-            <a:ext cx="1066800" cy="1061950"/>
-          </a:xfrm>
-          <a:prstGeom prst="rect">
-            <a:avLst/>
-          </a:prstGeom>
-        </p:spPr>
-      </p:pic>
     </p:spTree>
     <p:extLst>
       <p:ext uri="{BB962C8B-B14F-4D97-AF65-F5344CB8AC3E}">
@@ -3829,42 +3873,6 @@
           </a:p>
         </p:txBody>
       </p:sp>
-      <p:pic>
-        <p:nvPicPr>
-          <p:cNvPr id="4" name="Picture 3" descr="A close up of a sign&#10;&#10;Description automatically generated">
-            <a:extLst>
-              <a:ext uri="{FF2B5EF4-FFF2-40B4-BE49-F238E27FC236}">
-                <a16:creationId xmlns:a16="http://schemas.microsoft.com/office/drawing/2014/main" id="{FCB9F506-0398-B05C-F549-251FC8D28D24}"/>
-              </a:ext>
-            </a:extLst>
-          </p:cNvPr>
-          <p:cNvPicPr>
-            <a:picLocks noChangeAspect="1"/>
-          </p:cNvPicPr>
-          <p:nvPr userDrawn="1"/>
-        </p:nvPicPr>
-        <p:blipFill>
-          <a:blip r:embed="rId2">
-            <a:extLst>
-              <a:ext uri="{28A0092B-C50C-407E-A947-70E740481C1C}">
-                <a14:useLocalDpi xmlns:a14="http://schemas.microsoft.com/office/drawing/2010/main" val="0"/>
-              </a:ext>
-            </a:extLst>
-          </a:blip>
-          <a:stretch>
-            <a:fillRect/>
-          </a:stretch>
-        </p:blipFill>
-        <p:spPr>
-          <a:xfrm>
-            <a:off x="3810000" y="1143000"/>
-            <a:ext cx="4572000" cy="4572000"/>
-          </a:xfrm>
-          <a:prstGeom prst="rect">
-            <a:avLst/>
-          </a:prstGeom>
-        </p:spPr>
-      </p:pic>
     </p:spTree>
     <p:extLst>
       <p:ext uri="{BB962C8B-B14F-4D97-AF65-F5344CB8AC3E}">
@@ -4037,42 +4045,6 @@
           </a:p>
         </p:txBody>
       </p:sp>
-      <p:pic>
-        <p:nvPicPr>
-          <p:cNvPr id="3" name="Picture 2" descr="A close up of a sign&#10;&#10;Description automatically generated">
-            <a:extLst>
-              <a:ext uri="{FF2B5EF4-FFF2-40B4-BE49-F238E27FC236}">
-                <a16:creationId xmlns:a16="http://schemas.microsoft.com/office/drawing/2014/main" id="{EB072678-CEAB-620A-4C00-211B1F85580B}"/>
-              </a:ext>
-            </a:extLst>
-          </p:cNvPr>
-          <p:cNvPicPr>
-            <a:picLocks noChangeAspect="1"/>
-          </p:cNvPicPr>
-          <p:nvPr userDrawn="1"/>
-        </p:nvPicPr>
-        <p:blipFill>
-          <a:blip r:embed="rId2">
-            <a:extLst>
-              <a:ext uri="{28A0092B-C50C-407E-A947-70E740481C1C}">
-                <a14:useLocalDpi xmlns:a14="http://schemas.microsoft.com/office/drawing/2010/main" val="0"/>
-              </a:ext>
-            </a:extLst>
-          </a:blip>
-          <a:stretch>
-            <a:fillRect/>
-          </a:stretch>
-        </p:blipFill>
-        <p:spPr>
-          <a:xfrm>
-            <a:off x="3810000" y="1143000"/>
-            <a:ext cx="4572000" cy="4572000"/>
-          </a:xfrm>
-          <a:prstGeom prst="rect">
-            <a:avLst/>
-          </a:prstGeom>
-        </p:spPr>
-      </p:pic>
     </p:spTree>
     <p:extLst>
       <p:ext uri="{BB962C8B-B14F-4D97-AF65-F5344CB8AC3E}">
@@ -4454,42 +4426,6 @@
           </a:p>
         </p:txBody>
       </p:sp>
-      <p:pic>
-        <p:nvPicPr>
-          <p:cNvPr id="4" name="Picture 3" descr="A close up of a sign&#10;&#10;Description automatically generated">
-            <a:extLst>
-              <a:ext uri="{FF2B5EF4-FFF2-40B4-BE49-F238E27FC236}">
-                <a16:creationId xmlns:a16="http://schemas.microsoft.com/office/drawing/2014/main" id="{7E449073-A3A6-6A3A-DFE1-3F11F52E3A60}"/>
-              </a:ext>
-            </a:extLst>
-          </p:cNvPr>
-          <p:cNvPicPr>
-            <a:picLocks noChangeAspect="1"/>
-          </p:cNvPicPr>
-          <p:nvPr userDrawn="1"/>
-        </p:nvPicPr>
-        <p:blipFill>
-          <a:blip r:embed="rId2">
-            <a:extLst>
-              <a:ext uri="{28A0092B-C50C-407E-A947-70E740481C1C}">
-                <a14:useLocalDpi xmlns:a14="http://schemas.microsoft.com/office/drawing/2010/main" val="0"/>
-              </a:ext>
-            </a:extLst>
-          </a:blip>
-          <a:stretch>
-            <a:fillRect/>
-          </a:stretch>
-        </p:blipFill>
-        <p:spPr>
-          <a:xfrm>
-            <a:off x="3810000" y="1143000"/>
-            <a:ext cx="4572000" cy="4572000"/>
-          </a:xfrm>
-          <a:prstGeom prst="rect">
-            <a:avLst/>
-          </a:prstGeom>
-        </p:spPr>
-      </p:pic>
     </p:spTree>
     <p:extLst>
       <p:ext uri="{BB962C8B-B14F-4D97-AF65-F5344CB8AC3E}">
@@ -4705,41 +4641,6 @@
           </a:p>
         </p:txBody>
       </p:sp>
-      <p:pic>
-        <p:nvPicPr>
-          <p:cNvPr id="2" name="Picture 1">
-            <a:extLst>
-              <a:ext uri="{FF2B5EF4-FFF2-40B4-BE49-F238E27FC236}">
-                <a16:creationId xmlns:a16="http://schemas.microsoft.com/office/drawing/2014/main" id="{311F8D1C-C0A9-B7E2-0F75-E139CDC55569}"/>
-              </a:ext>
-            </a:extLst>
-          </p:cNvPr>
-          <p:cNvPicPr>
-            <a:picLocks noChangeAspect="1"/>
-          </p:cNvPicPr>
-          <p:nvPr userDrawn="1"/>
-        </p:nvPicPr>
-        <p:blipFill>
-          <a:blip r:embed="rId2">
-            <a:extLst>
-              <a:ext uri="{28A0092B-C50C-407E-A947-70E740481C1C}">
-                <a14:useLocalDpi xmlns:a14="http://schemas.microsoft.com/office/drawing/2010/main" val="0"/>
-              </a:ext>
-            </a:extLst>
-          </a:blip>
-          <a:srcRect/>
-          <a:stretch/>
-        </p:blipFill>
-        <p:spPr>
-          <a:xfrm>
-            <a:off x="381000" y="5643650"/>
-            <a:ext cx="1066800" cy="1061950"/>
-          </a:xfrm>
-          <a:prstGeom prst="rect">
-            <a:avLst/>
-          </a:prstGeom>
-        </p:spPr>
-      </p:pic>
     </p:spTree>
     <p:extLst>
       <p:ext uri="{BB962C8B-B14F-4D97-AF65-F5344CB8AC3E}">
@@ -5014,41 +4915,6 @@
           </a:p>
         </p:txBody>
       </p:sp>
-      <p:pic>
-        <p:nvPicPr>
-          <p:cNvPr id="2" name="Picture 1">
-            <a:extLst>
-              <a:ext uri="{FF2B5EF4-FFF2-40B4-BE49-F238E27FC236}">
-                <a16:creationId xmlns:a16="http://schemas.microsoft.com/office/drawing/2014/main" id="{8F45D532-443C-F308-5AD8-827F2C229965}"/>
-              </a:ext>
-            </a:extLst>
-          </p:cNvPr>
-          <p:cNvPicPr>
-            <a:picLocks noChangeAspect="1"/>
-          </p:cNvPicPr>
-          <p:nvPr userDrawn="1"/>
-        </p:nvPicPr>
-        <p:blipFill>
-          <a:blip r:embed="rId2">
-            <a:extLst>
-              <a:ext uri="{28A0092B-C50C-407E-A947-70E740481C1C}">
-                <a14:useLocalDpi xmlns:a14="http://schemas.microsoft.com/office/drawing/2010/main" val="0"/>
-              </a:ext>
-            </a:extLst>
-          </a:blip>
-          <a:srcRect/>
-          <a:stretch/>
-        </p:blipFill>
-        <p:spPr>
-          <a:xfrm>
-            <a:off x="381000" y="5643650"/>
-            <a:ext cx="1066800" cy="1061950"/>
-          </a:xfrm>
-          <a:prstGeom prst="rect">
-            <a:avLst/>
-          </a:prstGeom>
-        </p:spPr>
-      </p:pic>
     </p:spTree>
     <p:extLst>
       <p:ext uri="{BB962C8B-B14F-4D97-AF65-F5344CB8AC3E}">
@@ -6332,41 +6198,6 @@
           </a:p>
         </p:txBody>
       </p:sp>
-      <p:pic>
-        <p:nvPicPr>
-          <p:cNvPr id="5" name="Picture 4">
-            <a:extLst>
-              <a:ext uri="{FF2B5EF4-FFF2-40B4-BE49-F238E27FC236}">
-                <a16:creationId xmlns:a16="http://schemas.microsoft.com/office/drawing/2014/main" id="{79209EA9-9047-DE95-55E3-88A4E9B8A4EE}"/>
-              </a:ext>
-            </a:extLst>
-          </p:cNvPr>
-          <p:cNvPicPr>
-            <a:picLocks noChangeAspect="1"/>
-          </p:cNvPicPr>
-          <p:nvPr userDrawn="1"/>
-        </p:nvPicPr>
-        <p:blipFill>
-          <a:blip r:embed="rId2">
-            <a:extLst>
-              <a:ext uri="{28A0092B-C50C-407E-A947-70E740481C1C}">
-                <a14:useLocalDpi xmlns:a14="http://schemas.microsoft.com/office/drawing/2010/main" val="0"/>
-              </a:ext>
-            </a:extLst>
-          </a:blip>
-          <a:srcRect/>
-          <a:stretch/>
-        </p:blipFill>
-        <p:spPr>
-          <a:xfrm>
-            <a:off x="381000" y="5643650"/>
-            <a:ext cx="1066800" cy="1061950"/>
-          </a:xfrm>
-          <a:prstGeom prst="rect">
-            <a:avLst/>
-          </a:prstGeom>
-        </p:spPr>
-      </p:pic>
     </p:spTree>
     <p:extLst>
       <p:ext uri="{BB962C8B-B14F-4D97-AF65-F5344CB8AC3E}">
@@ -6774,41 +6605,6 @@
           </a:p>
         </p:txBody>
       </p:sp>
-      <p:pic>
-        <p:nvPicPr>
-          <p:cNvPr id="2" name="Picture 1">
-            <a:extLst>
-              <a:ext uri="{FF2B5EF4-FFF2-40B4-BE49-F238E27FC236}">
-                <a16:creationId xmlns:a16="http://schemas.microsoft.com/office/drawing/2014/main" id="{BA2D21E0-7537-BFD1-5C84-7C737617CFC6}"/>
-              </a:ext>
-            </a:extLst>
-          </p:cNvPr>
-          <p:cNvPicPr>
-            <a:picLocks noChangeAspect="1"/>
-          </p:cNvPicPr>
-          <p:nvPr userDrawn="1"/>
-        </p:nvPicPr>
-        <p:blipFill>
-          <a:blip r:embed="rId2">
-            <a:extLst>
-              <a:ext uri="{28A0092B-C50C-407E-A947-70E740481C1C}">
-                <a14:useLocalDpi xmlns:a14="http://schemas.microsoft.com/office/drawing/2010/main" val="0"/>
-              </a:ext>
-            </a:extLst>
-          </a:blip>
-          <a:srcRect/>
-          <a:stretch/>
-        </p:blipFill>
-        <p:spPr>
-          <a:xfrm>
-            <a:off x="381000" y="5643650"/>
-            <a:ext cx="1066800" cy="1061950"/>
-          </a:xfrm>
-          <a:prstGeom prst="rect">
-            <a:avLst/>
-          </a:prstGeom>
-        </p:spPr>
-      </p:pic>
     </p:spTree>
     <p:extLst>
       <p:ext uri="{BB962C8B-B14F-4D97-AF65-F5344CB8AC3E}">
@@ -7095,41 +6891,6 @@
           </a:p>
         </p:txBody>
       </p:sp>
-      <p:pic>
-        <p:nvPicPr>
-          <p:cNvPr id="2" name="Picture 1">
-            <a:extLst>
-              <a:ext uri="{FF2B5EF4-FFF2-40B4-BE49-F238E27FC236}">
-                <a16:creationId xmlns:a16="http://schemas.microsoft.com/office/drawing/2014/main" id="{DEAFF1B8-23EC-C646-D10E-81962FA67664}"/>
-              </a:ext>
-            </a:extLst>
-          </p:cNvPr>
-          <p:cNvPicPr>
-            <a:picLocks noChangeAspect="1"/>
-          </p:cNvPicPr>
-          <p:nvPr userDrawn="1"/>
-        </p:nvPicPr>
-        <p:blipFill>
-          <a:blip r:embed="rId2">
-            <a:extLst>
-              <a:ext uri="{28A0092B-C50C-407E-A947-70E740481C1C}">
-                <a14:useLocalDpi xmlns:a14="http://schemas.microsoft.com/office/drawing/2010/main" val="0"/>
-              </a:ext>
-            </a:extLst>
-          </a:blip>
-          <a:srcRect/>
-          <a:stretch/>
-        </p:blipFill>
-        <p:spPr>
-          <a:xfrm>
-            <a:off x="381000" y="5643650"/>
-            <a:ext cx="1066800" cy="1061950"/>
-          </a:xfrm>
-          <a:prstGeom prst="rect">
-            <a:avLst/>
-          </a:prstGeom>
-        </p:spPr>
-      </p:pic>
     </p:spTree>
     <p:extLst>
       <p:ext uri="{BB962C8B-B14F-4D97-AF65-F5344CB8AC3E}">
@@ -7377,41 +7138,6 @@
           </a:p>
         </p:txBody>
       </p:sp>
-      <p:pic>
-        <p:nvPicPr>
-          <p:cNvPr id="2" name="Picture 1">
-            <a:extLst>
-              <a:ext uri="{FF2B5EF4-FFF2-40B4-BE49-F238E27FC236}">
-                <a16:creationId xmlns:a16="http://schemas.microsoft.com/office/drawing/2014/main" id="{457FEA4E-BCEC-1DF5-1CA3-B1C4C7F9E784}"/>
-              </a:ext>
-            </a:extLst>
-          </p:cNvPr>
-          <p:cNvPicPr>
-            <a:picLocks noChangeAspect="1"/>
-          </p:cNvPicPr>
-          <p:nvPr userDrawn="1"/>
-        </p:nvPicPr>
-        <p:blipFill>
-          <a:blip r:embed="rId2">
-            <a:extLst>
-              <a:ext uri="{28A0092B-C50C-407E-A947-70E740481C1C}">
-                <a14:useLocalDpi xmlns:a14="http://schemas.microsoft.com/office/drawing/2010/main" val="0"/>
-              </a:ext>
-            </a:extLst>
-          </a:blip>
-          <a:srcRect/>
-          <a:stretch/>
-        </p:blipFill>
-        <p:spPr>
-          <a:xfrm>
-            <a:off x="381000" y="5643650"/>
-            <a:ext cx="1066800" cy="1061950"/>
-          </a:xfrm>
-          <a:prstGeom prst="rect">
-            <a:avLst/>
-          </a:prstGeom>
-        </p:spPr>
-      </p:pic>
     </p:spTree>
     <p:extLst>
       <p:ext uri="{BB962C8B-B14F-4D97-AF65-F5344CB8AC3E}">
@@ -7538,41 +7264,6 @@
           </a:p>
         </p:txBody>
       </p:sp>
-      <p:pic>
-        <p:nvPicPr>
-          <p:cNvPr id="2" name="Picture 1">
-            <a:extLst>
-              <a:ext uri="{FF2B5EF4-FFF2-40B4-BE49-F238E27FC236}">
-                <a16:creationId xmlns:a16="http://schemas.microsoft.com/office/drawing/2014/main" id="{951EC931-B5EA-F427-6283-B169991BCBF4}"/>
-              </a:ext>
-            </a:extLst>
-          </p:cNvPr>
-          <p:cNvPicPr>
-            <a:picLocks noChangeAspect="1"/>
-          </p:cNvPicPr>
-          <p:nvPr userDrawn="1"/>
-        </p:nvPicPr>
-        <p:blipFill>
-          <a:blip r:embed="rId2">
-            <a:extLst>
-              <a:ext uri="{28A0092B-C50C-407E-A947-70E740481C1C}">
-                <a14:useLocalDpi xmlns:a14="http://schemas.microsoft.com/office/drawing/2010/main" val="0"/>
-              </a:ext>
-            </a:extLst>
-          </a:blip>
-          <a:srcRect/>
-          <a:stretch/>
-        </p:blipFill>
-        <p:spPr>
-          <a:xfrm>
-            <a:off x="381000" y="5643650"/>
-            <a:ext cx="1066800" cy="1061950"/>
-          </a:xfrm>
-          <a:prstGeom prst="rect">
-            <a:avLst/>
-          </a:prstGeom>
-        </p:spPr>
-      </p:pic>
     </p:spTree>
     <p:extLst>
       <p:ext uri="{BB962C8B-B14F-4D97-AF65-F5344CB8AC3E}">
@@ -7714,7 +7405,7 @@
         <p:spPr>
           <a:xfrm>
             <a:off x="533400" y="6040438"/>
-            <a:ext cx="2514600" cy="554037"/>
+            <a:ext cx="2514600" cy="246221"/>
           </a:xfrm>
           <a:prstGeom prst="rect">
             <a:avLst/>
@@ -7736,33 +7427,7 @@
                   <a:srgbClr val="C0C2C4"/>
                 </a:solidFill>
               </a:rPr>
-              <a:t>CYBERSECURITY &amp;</a:t>
-            </a:r>
-          </a:p>
-          <a:p>
-            <a:pPr>
-              <a:defRPr/>
-            </a:pPr>
-            <a:r>
-              <a:rPr lang="en-US" sz="1000" spc="300" dirty="0">
-                <a:solidFill>
-                  <a:srgbClr val="C0C2C4"/>
-                </a:solidFill>
-              </a:rPr>
-              <a:t>INFRASTRUCTURE</a:t>
-            </a:r>
-          </a:p>
-          <a:p>
-            <a:pPr>
-              <a:defRPr/>
-            </a:pPr>
-            <a:r>
-              <a:rPr lang="en-US" sz="1000" spc="300" dirty="0">
-                <a:solidFill>
-                  <a:srgbClr val="C0C2C4"/>
-                </a:solidFill>
-              </a:rPr>
-              <a:t>SECURITY AGENCY</a:t>
+              <a:t>SECURITY TEAM</a:t>
             </a:r>
           </a:p>
         </p:txBody>
@@ -8620,4 +8285,319 @@
     </a:extraClrScheme>
   </a:extraClrSchemeLst>
 </a:theme>
+</file>
+
+<file path=ppt/theme/theme2.xml><?xml version="1.0" encoding="utf-8"?>
+<a:theme xmlns:a="http://schemas.openxmlformats.org/drawingml/2006/main" name="Office Theme">
+  <a:themeElements>
+    <a:clrScheme name="Office">
+      <a:dk1>
+        <a:sysClr val="windowText" lastClr="000000"/>
+      </a:dk1>
+      <a:lt1>
+        <a:sysClr val="window" lastClr="FFFFFF"/>
+      </a:lt1>
+      <a:dk2>
+        <a:srgbClr val="0E2841"/>
+      </a:dk2>
+      <a:lt2>
+        <a:srgbClr val="E8E8E8"/>
+      </a:lt2>
+      <a:accent1>
+        <a:srgbClr val="156082"/>
+      </a:accent1>
+      <a:accent2>
+        <a:srgbClr val="E97132"/>
+      </a:accent2>
+      <a:accent3>
+        <a:srgbClr val="196B24"/>
+      </a:accent3>
+      <a:accent4>
+        <a:srgbClr val="0F9ED5"/>
+      </a:accent4>
+      <a:accent5>
+        <a:srgbClr val="A02B93"/>
+      </a:accent5>
+      <a:accent6>
+        <a:srgbClr val="4EA72E"/>
+      </a:accent6>
+      <a:hlink>
+        <a:srgbClr val="467886"/>
+      </a:hlink>
+      <a:folHlink>
+        <a:srgbClr val="96607D"/>
+      </a:folHlink>
+    </a:clrScheme>
+    <a:fontScheme name="Office">
+      <a:majorFont>
+        <a:latin typeface="Aptos Display" panose="02110004020202020204"/>
+        <a:ea typeface=""/>
+        <a:cs typeface=""/>
+        <a:font script="Jpan" typeface="游ゴシック Light"/>
+        <a:font script="Hang" typeface="맑은 고딕"/>
+        <a:font script="Hans" typeface="等线 Light"/>
+        <a:font script="Hant" typeface="新細明體"/>
+        <a:font script="Arab" typeface="Times New Roman"/>
+        <a:font script="Hebr" typeface="Times New Roman"/>
+        <a:font script="Thai" typeface="Angsana New"/>
+        <a:font script="Ethi" typeface="Nyala"/>
+        <a:font script="Beng" typeface="Vrinda"/>
+        <a:font script="Gujr" typeface="Shruti"/>
+        <a:font script="Khmr" typeface="MoolBoran"/>
+        <a:font script="Knda" typeface="Tunga"/>
+        <a:font script="Guru" typeface="Raavi"/>
+        <a:font script="Cans" typeface="Euphemia"/>
+        <a:font script="Cher" typeface="Plantagenet Cherokee"/>
+        <a:font script="Yiii" typeface="Microsoft Yi Baiti"/>
+        <a:font script="Tibt" typeface="Microsoft Himalaya"/>
+        <a:font script="Thaa" typeface="MV Boli"/>
+        <a:font script="Deva" typeface="Mangal"/>
+        <a:font script="Telu" typeface="Gautami"/>
+        <a:font script="Taml" typeface="Latha"/>
+        <a:font script="Syrc" typeface="Estrangelo Edessa"/>
+        <a:font script="Orya" typeface="Kalinga"/>
+        <a:font script="Mlym" typeface="Kartika"/>
+        <a:font script="Laoo" typeface="DokChampa"/>
+        <a:font script="Sinh" typeface="Iskoola Pota"/>
+        <a:font script="Mong" typeface="Mongolian Baiti"/>
+        <a:font script="Viet" typeface="Times New Roman"/>
+        <a:font script="Uigh" typeface="Microsoft Uighur"/>
+        <a:font script="Geor" typeface="Sylfaen"/>
+        <a:font script="Armn" typeface="Arial"/>
+        <a:font script="Bugi" typeface="Leelawadee UI"/>
+        <a:font script="Bopo" typeface="Microsoft JhengHei"/>
+        <a:font script="Java" typeface="Javanese Text"/>
+        <a:font script="Lisu" typeface="Segoe UI"/>
+        <a:font script="Mymr" typeface="Myanmar Text"/>
+        <a:font script="Nkoo" typeface="Ebrima"/>
+        <a:font script="Olck" typeface="Nirmala UI"/>
+        <a:font script="Osma" typeface="Ebrima"/>
+        <a:font script="Phag" typeface="Phagspa"/>
+        <a:font script="Syrn" typeface="Estrangelo Edessa"/>
+        <a:font script="Syrj" typeface="Estrangelo Edessa"/>
+        <a:font script="Syre" typeface="Estrangelo Edessa"/>
+        <a:font script="Sora" typeface="Nirmala UI"/>
+        <a:font script="Tale" typeface="Microsoft Tai Le"/>
+        <a:font script="Talu" typeface="Microsoft New Tai Lue"/>
+        <a:font script="Tfng" typeface="Ebrima"/>
+      </a:majorFont>
+      <a:minorFont>
+        <a:latin typeface="Aptos" panose="02110004020202020204"/>
+        <a:ea typeface=""/>
+        <a:cs typeface=""/>
+        <a:font script="Jpan" typeface="游ゴシック"/>
+        <a:font script="Hang" typeface="맑은 고딕"/>
+        <a:font script="Hans" typeface="等线"/>
+        <a:font script="Hant" typeface="新細明體"/>
+        <a:font script="Arab" typeface="Arial"/>
+        <a:font script="Hebr" typeface="Arial"/>
+        <a:font script="Thai" typeface="Cordia New"/>
+        <a:font script="Ethi" typeface="Nyala"/>
+        <a:font script="Beng" typeface="Vrinda"/>
+        <a:font script="Gujr" typeface="Shruti"/>
+        <a:font script="Khmr" typeface="DaunPenh"/>
+        <a:font script="Knda" typeface="Tunga"/>
+        <a:font script="Guru" typeface="Raavi"/>
+        <a:font script="Cans" typeface="Euphemia"/>
+        <a:font script="Cher" typeface="Plantagenet Cherokee"/>
+        <a:font script="Yiii" typeface="Microsoft Yi Baiti"/>
+        <a:font script="Tibt" typeface="Microsoft Himalaya"/>
+        <a:font script="Thaa" typeface="MV Boli"/>
+        <a:font script="Deva" typeface="Mangal"/>
+        <a:font script="Telu" typeface="Gautami"/>
+        <a:font script="Taml" typeface="Latha"/>
+        <a:font script="Syrc" typeface="Estrangelo Edessa"/>
+        <a:font script="Orya" typeface="Kalinga"/>
+        <a:font script="Mlym" typeface="Kartika"/>
+        <a:font script="Laoo" typeface="DokChampa"/>
+        <a:font script="Sinh" typeface="Iskoola Pota"/>
+        <a:font script="Mong" typeface="Mongolian Baiti"/>
+        <a:font script="Viet" typeface="Arial"/>
+        <a:font script="Uigh" typeface="Microsoft Uighur"/>
+        <a:font script="Geor" typeface="Sylfaen"/>
+        <a:font script="Armn" typeface="Arial"/>
+        <a:font script="Bugi" typeface="Leelawadee UI"/>
+        <a:font script="Bopo" typeface="Microsoft JhengHei"/>
+        <a:font script="Java" typeface="Javanese Text"/>
+        <a:font script="Lisu" typeface="Segoe UI"/>
+        <a:font script="Mymr" typeface="Myanmar Text"/>
+        <a:font script="Nkoo" typeface="Ebrima"/>
+        <a:font script="Olck" typeface="Nirmala UI"/>
+        <a:font script="Osma" typeface="Ebrima"/>
+        <a:font script="Phag" typeface="Phagspa"/>
+        <a:font script="Syrn" typeface="Estrangelo Edessa"/>
+        <a:font script="Syrj" typeface="Estrangelo Edessa"/>
+        <a:font script="Syre" typeface="Estrangelo Edessa"/>
+        <a:font script="Sora" typeface="Nirmala UI"/>
+        <a:font script="Tale" typeface="Microsoft Tai Le"/>
+        <a:font script="Talu" typeface="Microsoft New Tai Lue"/>
+        <a:font script="Tfng" typeface="Ebrima"/>
+      </a:minorFont>
+    </a:fontScheme>
+    <a:fmtScheme name="Office">
+      <a:fillStyleLst>
+        <a:solidFill>
+          <a:schemeClr val="phClr"/>
+        </a:solidFill>
+        <a:gradFill rotWithShape="1">
+          <a:gsLst>
+            <a:gs pos="0">
+              <a:schemeClr val="phClr">
+                <a:lumMod val="110000"/>
+                <a:satMod val="105000"/>
+                <a:tint val="67000"/>
+              </a:schemeClr>
+            </a:gs>
+            <a:gs pos="50000">
+              <a:schemeClr val="phClr">
+                <a:lumMod val="105000"/>
+                <a:satMod val="103000"/>
+                <a:tint val="73000"/>
+              </a:schemeClr>
+            </a:gs>
+            <a:gs pos="100000">
+              <a:schemeClr val="phClr">
+                <a:lumMod val="105000"/>
+                <a:satMod val="109000"/>
+                <a:tint val="81000"/>
+              </a:schemeClr>
+            </a:gs>
+          </a:gsLst>
+          <a:lin ang="5400000" scaled="0"/>
+        </a:gradFill>
+        <a:gradFill rotWithShape="1">
+          <a:gsLst>
+            <a:gs pos="0">
+              <a:schemeClr val="phClr">
+                <a:satMod val="103000"/>
+                <a:lumMod val="102000"/>
+                <a:tint val="94000"/>
+              </a:schemeClr>
+            </a:gs>
+            <a:gs pos="50000">
+              <a:schemeClr val="phClr">
+                <a:satMod val="110000"/>
+                <a:lumMod val="100000"/>
+                <a:shade val="100000"/>
+              </a:schemeClr>
+            </a:gs>
+            <a:gs pos="100000">
+              <a:schemeClr val="phClr">
+                <a:lumMod val="99000"/>
+                <a:satMod val="120000"/>
+                <a:shade val="78000"/>
+              </a:schemeClr>
+            </a:gs>
+          </a:gsLst>
+          <a:lin ang="5400000" scaled="0"/>
+        </a:gradFill>
+      </a:fillStyleLst>
+      <a:lnStyleLst>
+        <a:ln w="12700" cap="flat" cmpd="sng" algn="ctr">
+          <a:solidFill>
+            <a:schemeClr val="phClr"/>
+          </a:solidFill>
+          <a:prstDash val="solid"/>
+          <a:miter lim="800000"/>
+        </a:ln>
+        <a:ln w="19050" cap="flat" cmpd="sng" algn="ctr">
+          <a:solidFill>
+            <a:schemeClr val="phClr"/>
+          </a:solidFill>
+          <a:prstDash val="solid"/>
+          <a:miter lim="800000"/>
+        </a:ln>
+        <a:ln w="25400" cap="flat" cmpd="sng" algn="ctr">
+          <a:solidFill>
+            <a:schemeClr val="phClr"/>
+          </a:solidFill>
+          <a:prstDash val="solid"/>
+          <a:miter lim="800000"/>
+        </a:ln>
+      </a:lnStyleLst>
+      <a:effectStyleLst>
+        <a:effectStyle>
+          <a:effectLst/>
+        </a:effectStyle>
+        <a:effectStyle>
+          <a:effectLst/>
+        </a:effectStyle>
+        <a:effectStyle>
+          <a:effectLst>
+            <a:outerShdw blurRad="57150" dist="19050" dir="5400000" algn="ctr" rotWithShape="0">
+              <a:srgbClr val="000000">
+                <a:alpha val="63000"/>
+              </a:srgbClr>
+            </a:outerShdw>
+          </a:effectLst>
+        </a:effectStyle>
+      </a:effectStyleLst>
+      <a:bgFillStyleLst>
+        <a:solidFill>
+          <a:schemeClr val="phClr"/>
+        </a:solidFill>
+        <a:solidFill>
+          <a:schemeClr val="phClr">
+            <a:tint val="95000"/>
+            <a:satMod val="170000"/>
+          </a:schemeClr>
+        </a:solidFill>
+        <a:gradFill rotWithShape="1">
+          <a:gsLst>
+            <a:gs pos="0">
+              <a:schemeClr val="phClr">
+                <a:tint val="93000"/>
+                <a:satMod val="150000"/>
+                <a:shade val="98000"/>
+                <a:lumMod val="102000"/>
+              </a:schemeClr>
+            </a:gs>
+            <a:gs pos="50000">
+              <a:schemeClr val="phClr">
+                <a:tint val="98000"/>
+                <a:satMod val="130000"/>
+                <a:shade val="90000"/>
+                <a:lumMod val="103000"/>
+              </a:schemeClr>
+            </a:gs>
+            <a:gs pos="100000">
+              <a:schemeClr val="phClr">
+                <a:shade val="63000"/>
+                <a:satMod val="120000"/>
+              </a:schemeClr>
+            </a:gs>
+          </a:gsLst>
+          <a:lin ang="5400000" scaled="0"/>
+        </a:gradFill>
+      </a:bgFillStyleLst>
+    </a:fmtScheme>
+  </a:themeElements>
+  <a:objectDefaults>
+    <a:lnDef>
+      <a:spPr/>
+      <a:bodyPr/>
+      <a:lstStyle/>
+      <a:style>
+        <a:lnRef idx="2">
+          <a:schemeClr val="accent1"/>
+        </a:lnRef>
+        <a:fillRef idx="0">
+          <a:schemeClr val="accent1"/>
+        </a:fillRef>
+        <a:effectRef idx="1">
+          <a:schemeClr val="accent1"/>
+        </a:effectRef>
+        <a:fontRef idx="minor">
+          <a:schemeClr val="tx1"/>
+        </a:fontRef>
+      </a:style>
+    </a:lnDef>
+  </a:objectDefaults>
+  <a:extraClrSchemeLst/>
+  <a:extLst>
+    <a:ext uri="{05A4C25C-085E-4340-85A3-A5531E510DB2}">
+      <thm15:themeFamily xmlns:thm15="http://schemas.microsoft.com/office/thememl/2012/main" name="Office Theme" id="{2E142A2C-CD16-42D6-873A-C26D2A0506FA}" vid="{1BDDFF52-6CD6-40A5-AB3C-68EB2F1E4D0A}"/>
+    </a:ext>
+  </a:extLst>
+</a:theme>
 </file>
</xml_diff>